<commit_message>
Added Pics to pdf file
</commit_message>
<xml_diff>
--- a/Pdf/learningApp.pptx
+++ b/Pdf/learningApp.pptx
@@ -6,6 +6,7 @@
   </p:sldMasterIdLst>
   <p:sldIdLst>
     <p:sldId id="256" r:id="rId2"/>
+    <p:sldId id="257" r:id="rId3"/>
   </p:sldIdLst>
   <p:sldSz cx="12192000" cy="6858000"/>
   <p:notesSz cx="6858000" cy="9144000"/>
@@ -3178,6 +3179,428 @@
 </p:sld>
 </file>
 
+<file path=ppt/slides/slide2.xml><?xml version="1.0" encoding="utf-8"?>
+<p:sld xmlns:a="http://schemas.openxmlformats.org/drawingml/2006/main" xmlns:r="http://schemas.openxmlformats.org/officeDocument/2006/relationships" xmlns:p="http://schemas.openxmlformats.org/presentationml/2006/main">
+  <p:cSld>
+    <p:spTree>
+      <p:nvGrpSpPr>
+        <p:cNvPr id="1" name=""/>
+        <p:cNvGrpSpPr/>
+        <p:nvPr/>
+      </p:nvGrpSpPr>
+      <p:grpSpPr>
+        <a:xfrm>
+          <a:off x="0" y="0"/>
+          <a:ext cx="0" cy="0"/>
+          <a:chOff x="0" y="0"/>
+          <a:chExt cx="0" cy="0"/>
+        </a:xfrm>
+      </p:grpSpPr>
+      <p:pic>
+        <p:nvPicPr>
+          <p:cNvPr id="4" name="Picture 3"/>
+          <p:cNvPicPr>
+            <a:picLocks noChangeAspect="1"/>
+          </p:cNvPicPr>
+          <p:nvPr/>
+        </p:nvPicPr>
+        <p:blipFill>
+          <a:blip r:embed="rId2"/>
+          <a:stretch>
+            <a:fillRect/>
+          </a:stretch>
+        </p:blipFill>
+        <p:spPr>
+          <a:xfrm>
+            <a:off x="2479061" y="1419887"/>
+            <a:ext cx="2234541" cy="4603692"/>
+          </a:xfrm>
+          <a:prstGeom prst="rect">
+            <a:avLst/>
+          </a:prstGeom>
+          <a:ln>
+            <a:noFill/>
+          </a:ln>
+          <a:effectLst>
+            <a:outerShdw blurRad="149987" dist="250190" dir="8460000" algn="ctr">
+              <a:srgbClr val="000000">
+                <a:alpha val="28000"/>
+              </a:srgbClr>
+            </a:outerShdw>
+          </a:effectLst>
+          <a:scene3d>
+            <a:camera prst="orthographicFront">
+              <a:rot lat="0" lon="0" rev="0"/>
+            </a:camera>
+            <a:lightRig rig="contrasting" dir="t">
+              <a:rot lat="0" lon="0" rev="1500000"/>
+            </a:lightRig>
+          </a:scene3d>
+          <a:sp3d prstMaterial="metal">
+            <a:bevelT w="88900" h="88900"/>
+          </a:sp3d>
+        </p:spPr>
+      </p:pic>
+      <p:sp>
+        <p:nvSpPr>
+          <p:cNvPr id="5" name="Title 1"/>
+          <p:cNvSpPr>
+            <a:spLocks noGrp="1"/>
+          </p:cNvSpPr>
+          <p:nvPr>
+            <p:ph type="ctrTitle"/>
+          </p:nvPr>
+        </p:nvSpPr>
+        <p:spPr>
+          <a:xfrm>
+            <a:off x="398352" y="334978"/>
+            <a:ext cx="5957181" cy="506996"/>
+          </a:xfrm>
+          <a:solidFill>
+            <a:srgbClr val="7030A0"/>
+          </a:solidFill>
+          <a:ln>
+            <a:noFill/>
+          </a:ln>
+          <a:effectLst>
+            <a:outerShdw blurRad="190500" dist="228600" dir="2700000" algn="ctr">
+              <a:srgbClr val="000000">
+                <a:alpha val="30000"/>
+              </a:srgbClr>
+            </a:outerShdw>
+          </a:effectLst>
+          <a:scene3d>
+            <a:camera prst="orthographicFront">
+              <a:rot lat="0" lon="0" rev="0"/>
+            </a:camera>
+            <a:lightRig rig="glow" dir="t">
+              <a:rot lat="0" lon="0" rev="4800000"/>
+            </a:lightRig>
+          </a:scene3d>
+          <a:sp3d prstMaterial="matte">
+            <a:bevelT w="127000" h="63500"/>
+          </a:sp3d>
+        </p:spPr>
+        <p:txBody>
+          <a:bodyPr>
+            <a:normAutofit/>
+          </a:bodyPr>
+          <a:lstStyle/>
+          <a:p>
+            <a:pPr algn="l"/>
+            <a:r>
+              <a:rPr lang="en-US" sz="2800" b="1" dirty="0" smtClean="0">
+                <a:solidFill>
+                  <a:schemeClr val="bg1"/>
+                </a:solidFill>
+                <a:latin typeface="Arial" panose="020B0604020202020204" pitchFamily="34" charset="0"/>
+                <a:cs typeface="Arial" panose="020B0604020202020204" pitchFamily="34" charset="0"/>
+              </a:rPr>
+              <a:t>Learning eSkills App</a:t>
+            </a:r>
+            <a:endParaRPr lang="en-US" sz="2800" b="1" dirty="0">
+              <a:solidFill>
+                <a:schemeClr val="bg1"/>
+              </a:solidFill>
+              <a:latin typeface="Arial" panose="020B0604020202020204" pitchFamily="34" charset="0"/>
+              <a:cs typeface="Arial" panose="020B0604020202020204" pitchFamily="34" charset="0"/>
+            </a:endParaRPr>
+          </a:p>
+        </p:txBody>
+      </p:sp>
+      <p:sp>
+        <p:nvSpPr>
+          <p:cNvPr id="6" name="Title 1"/>
+          <p:cNvSpPr txBox="1">
+            <a:spLocks/>
+          </p:cNvSpPr>
+          <p:nvPr/>
+        </p:nvSpPr>
+        <p:spPr>
+          <a:xfrm>
+            <a:off x="398352" y="1077363"/>
+            <a:ext cx="1711106" cy="342524"/>
+          </a:xfrm>
+          <a:prstGeom prst="rect">
+            <a:avLst/>
+          </a:prstGeom>
+          <a:solidFill>
+            <a:schemeClr val="tx1">
+              <a:lumMod val="85000"/>
+              <a:lumOff val="15000"/>
+            </a:schemeClr>
+          </a:solidFill>
+          <a:ln>
+            <a:noFill/>
+          </a:ln>
+          <a:effectLst>
+            <a:outerShdw blurRad="190500" dist="228600" dir="2700000" algn="ctr">
+              <a:srgbClr val="000000">
+                <a:alpha val="30000"/>
+              </a:srgbClr>
+            </a:outerShdw>
+          </a:effectLst>
+          <a:scene3d>
+            <a:camera prst="orthographicFront">
+              <a:rot lat="0" lon="0" rev="0"/>
+            </a:camera>
+            <a:lightRig rig="glow" dir="t">
+              <a:rot lat="0" lon="0" rev="4800000"/>
+            </a:lightRig>
+          </a:scene3d>
+          <a:sp3d prstMaterial="matte">
+            <a:bevelT w="127000" h="63500"/>
+          </a:sp3d>
+        </p:spPr>
+        <p:txBody>
+          <a:bodyPr vert="horz" lIns="91440" tIns="45720" rIns="91440" bIns="45720" rtlCol="0" anchor="b">
+            <a:normAutofit fontScale="85000" lnSpcReduction="10000"/>
+          </a:bodyPr>
+          <a:lstStyle>
+            <a:lvl1pPr algn="ctr" defTabSz="914400" rtl="0" eaLnBrk="1" latinLnBrk="0" hangingPunct="1">
+              <a:lnSpc>
+                <a:spcPct val="90000"/>
+              </a:lnSpc>
+              <a:spcBef>
+                <a:spcPct val="0"/>
+              </a:spcBef>
+              <a:buNone/>
+              <a:defRPr sz="6000" kern="1200">
+                <a:solidFill>
+                  <a:schemeClr val="tx1"/>
+                </a:solidFill>
+                <a:latin typeface="+mj-lt"/>
+                <a:ea typeface="+mj-ea"/>
+                <a:cs typeface="+mj-cs"/>
+              </a:defRPr>
+            </a:lvl1pPr>
+          </a:lstStyle>
+          <a:p>
+            <a:pPr algn="l"/>
+            <a:r>
+              <a:rPr lang="en-US" sz="1800" b="1" dirty="0" smtClean="0">
+                <a:solidFill>
+                  <a:schemeClr val="bg1"/>
+                </a:solidFill>
+                <a:latin typeface="Arial" panose="020B0604020202020204" pitchFamily="34" charset="0"/>
+                <a:cs typeface="Arial" panose="020B0604020202020204" pitchFamily="34" charset="0"/>
+              </a:rPr>
+              <a:t>Second Screen</a:t>
+            </a:r>
+            <a:endParaRPr lang="en-US" sz="1800" b="1" dirty="0">
+              <a:solidFill>
+                <a:schemeClr val="bg1"/>
+              </a:solidFill>
+              <a:latin typeface="Arial" panose="020B0604020202020204" pitchFamily="34" charset="0"/>
+              <a:cs typeface="Arial" panose="020B0604020202020204" pitchFamily="34" charset="0"/>
+            </a:endParaRPr>
+          </a:p>
+        </p:txBody>
+      </p:sp>
+      <p:pic>
+        <p:nvPicPr>
+          <p:cNvPr id="2" name="Picture 1"/>
+          <p:cNvPicPr>
+            <a:picLocks noChangeAspect="1"/>
+          </p:cNvPicPr>
+          <p:nvPr/>
+        </p:nvPicPr>
+        <p:blipFill>
+          <a:blip r:embed="rId3"/>
+          <a:stretch>
+            <a:fillRect/>
+          </a:stretch>
+        </p:blipFill>
+        <p:spPr>
+          <a:xfrm>
+            <a:off x="6808206" y="334977"/>
+            <a:ext cx="3069125" cy="6392143"/>
+          </a:xfrm>
+          <a:prstGeom prst="rect">
+            <a:avLst/>
+          </a:prstGeom>
+          <a:ln>
+            <a:noFill/>
+          </a:ln>
+          <a:effectLst>
+            <a:outerShdw blurRad="149987" dist="250190" dir="8460000" algn="ctr">
+              <a:srgbClr val="000000">
+                <a:alpha val="28000"/>
+              </a:srgbClr>
+            </a:outerShdw>
+          </a:effectLst>
+          <a:scene3d>
+            <a:camera prst="orthographicFront">
+              <a:rot lat="0" lon="0" rev="0"/>
+            </a:camera>
+            <a:lightRig rig="contrasting" dir="t">
+              <a:rot lat="0" lon="0" rev="1500000"/>
+            </a:lightRig>
+          </a:scene3d>
+          <a:sp3d prstMaterial="metal">
+            <a:bevelT w="88900" h="88900"/>
+          </a:sp3d>
+        </p:spPr>
+      </p:pic>
+      <p:sp>
+        <p:nvSpPr>
+          <p:cNvPr id="7" name="Right Arrow 6"/>
+          <p:cNvSpPr/>
+          <p:nvPr/>
+        </p:nvSpPr>
+        <p:spPr>
+          <a:xfrm>
+            <a:off x="4952245" y="3441583"/>
+            <a:ext cx="1611517" cy="795438"/>
+          </a:xfrm>
+          <a:prstGeom prst="rightArrow">
+            <a:avLst/>
+          </a:prstGeom>
+          <a:solidFill>
+            <a:schemeClr val="tx1"/>
+          </a:solidFill>
+          <a:ln>
+            <a:noFill/>
+          </a:ln>
+          <a:effectLst>
+            <a:outerShdw blurRad="149987" dist="250190" dir="8460000" algn="ctr">
+              <a:srgbClr val="000000">
+                <a:alpha val="28000"/>
+              </a:srgbClr>
+            </a:outerShdw>
+          </a:effectLst>
+          <a:scene3d>
+            <a:camera prst="orthographicFront">
+              <a:rot lat="0" lon="0" rev="0"/>
+            </a:camera>
+            <a:lightRig rig="contrasting" dir="t">
+              <a:rot lat="0" lon="0" rev="1500000"/>
+            </a:lightRig>
+          </a:scene3d>
+          <a:sp3d prstMaterial="metal">
+            <a:bevelT w="88900" h="88900"/>
+          </a:sp3d>
+        </p:spPr>
+        <p:style>
+          <a:lnRef idx="2">
+            <a:schemeClr val="accent1">
+              <a:shade val="50000"/>
+            </a:schemeClr>
+          </a:lnRef>
+          <a:fillRef idx="1">
+            <a:schemeClr val="accent1"/>
+          </a:fillRef>
+          <a:effectRef idx="0">
+            <a:schemeClr val="accent1"/>
+          </a:effectRef>
+          <a:fontRef idx="minor">
+            <a:schemeClr val="lt1"/>
+          </a:fontRef>
+        </p:style>
+        <p:txBody>
+          <a:bodyPr rtlCol="0" anchor="ctr"/>
+          <a:lstStyle/>
+          <a:p>
+            <a:pPr algn="ctr"/>
+            <a:endParaRPr lang="en-US"/>
+          </a:p>
+        </p:txBody>
+      </p:sp>
+      <p:sp>
+        <p:nvSpPr>
+          <p:cNvPr id="3" name="Oval 2"/>
+          <p:cNvSpPr/>
+          <p:nvPr/>
+        </p:nvSpPr>
+        <p:spPr>
+          <a:xfrm>
+            <a:off x="2824679" y="2697931"/>
+            <a:ext cx="651849" cy="280658"/>
+          </a:xfrm>
+          <a:prstGeom prst="ellipse">
+            <a:avLst/>
+          </a:prstGeom>
+          <a:noFill/>
+          <a:ln w="28575">
+            <a:solidFill>
+              <a:srgbClr val="FF0000"/>
+            </a:solidFill>
+          </a:ln>
+        </p:spPr>
+        <p:style>
+          <a:lnRef idx="2">
+            <a:schemeClr val="accent1">
+              <a:shade val="50000"/>
+            </a:schemeClr>
+          </a:lnRef>
+          <a:fillRef idx="1">
+            <a:schemeClr val="accent1"/>
+          </a:fillRef>
+          <a:effectRef idx="0">
+            <a:schemeClr val="accent1"/>
+          </a:effectRef>
+          <a:fontRef idx="minor">
+            <a:schemeClr val="lt1"/>
+          </a:fontRef>
+        </p:style>
+        <p:txBody>
+          <a:bodyPr rtlCol="0" anchor="ctr"/>
+          <a:lstStyle/>
+          <a:p>
+            <a:pPr algn="ctr"/>
+            <a:endParaRPr lang="en-US"/>
+          </a:p>
+        </p:txBody>
+      </p:sp>
+      <p:cxnSp>
+        <p:nvCxnSpPr>
+          <p:cNvPr id="9" name="Straight Arrow Connector 8"/>
+          <p:cNvCxnSpPr/>
+          <p:nvPr/>
+        </p:nvCxnSpPr>
+        <p:spPr>
+          <a:xfrm flipV="1">
+            <a:off x="3440313" y="2534970"/>
+            <a:ext cx="4327557" cy="303291"/>
+          </a:xfrm>
+          <a:prstGeom prst="straightConnector1">
+            <a:avLst/>
+          </a:prstGeom>
+          <a:ln w="38100">
+            <a:solidFill>
+              <a:srgbClr val="FF0000"/>
+            </a:solidFill>
+            <a:tailEnd type="triangle"/>
+          </a:ln>
+        </p:spPr>
+        <p:style>
+          <a:lnRef idx="1">
+            <a:schemeClr val="accent1"/>
+          </a:lnRef>
+          <a:fillRef idx="0">
+            <a:schemeClr val="accent1"/>
+          </a:fillRef>
+          <a:effectRef idx="0">
+            <a:schemeClr val="accent1"/>
+          </a:effectRef>
+          <a:fontRef idx="minor">
+            <a:schemeClr val="tx1"/>
+          </a:fontRef>
+        </p:style>
+      </p:cxnSp>
+    </p:spTree>
+    <p:extLst>
+      <p:ext uri="{BB962C8B-B14F-4D97-AF65-F5344CB8AC3E}">
+        <p14:creationId xmlns:p14="http://schemas.microsoft.com/office/powerpoint/2010/main" val="3748651578"/>
+      </p:ext>
+    </p:extLst>
+  </p:cSld>
+  <p:clrMapOvr>
+    <a:masterClrMapping/>
+  </p:clrMapOvr>
+</p:sld>
+</file>
+
 <file path=ppt/theme/theme1.xml><?xml version="1.0" encoding="utf-8"?>
 <a:theme xmlns:a="http://schemas.openxmlformats.org/drawingml/2006/main" name="Office Theme">
   <a:themeElements>

</xml_diff>

<commit_message>
Added More Pics to pdf file
</commit_message>
<xml_diff>
--- a/Pdf/learningApp.pptx
+++ b/Pdf/learningApp.pptx
@@ -7,6 +7,7 @@
   <p:sldIdLst>
     <p:sldId id="256" r:id="rId2"/>
     <p:sldId id="257" r:id="rId3"/>
+    <p:sldId id="258" r:id="rId4"/>
   </p:sldIdLst>
   <p:sldSz cx="12192000" cy="6858000"/>
   <p:notesSz cx="6858000" cy="9144000"/>
@@ -3601,6 +3602,283 @@
 </p:sld>
 </file>
 
+<file path=ppt/slides/slide3.xml><?xml version="1.0" encoding="utf-8"?>
+<p:sld xmlns:a="http://schemas.openxmlformats.org/drawingml/2006/main" xmlns:r="http://schemas.openxmlformats.org/officeDocument/2006/relationships" xmlns:p="http://schemas.openxmlformats.org/presentationml/2006/main">
+  <p:cSld>
+    <p:spTree>
+      <p:nvGrpSpPr>
+        <p:cNvPr id="1" name=""/>
+        <p:cNvGrpSpPr/>
+        <p:nvPr/>
+      </p:nvGrpSpPr>
+      <p:grpSpPr>
+        <a:xfrm>
+          <a:off x="0" y="0"/>
+          <a:ext cx="0" cy="0"/>
+          <a:chOff x="0" y="0"/>
+          <a:chExt cx="0" cy="0"/>
+        </a:xfrm>
+      </p:grpSpPr>
+      <p:sp>
+        <p:nvSpPr>
+          <p:cNvPr id="5" name="Title 1"/>
+          <p:cNvSpPr>
+            <a:spLocks noGrp="1"/>
+          </p:cNvSpPr>
+          <p:nvPr>
+            <p:ph type="ctrTitle"/>
+          </p:nvPr>
+        </p:nvSpPr>
+        <p:spPr>
+          <a:xfrm>
+            <a:off x="398352" y="334978"/>
+            <a:ext cx="5957181" cy="506996"/>
+          </a:xfrm>
+          <a:solidFill>
+            <a:srgbClr val="7030A0"/>
+          </a:solidFill>
+          <a:ln>
+            <a:noFill/>
+          </a:ln>
+          <a:effectLst>
+            <a:outerShdw blurRad="190500" dist="228600" dir="2700000" algn="ctr">
+              <a:srgbClr val="000000">
+                <a:alpha val="30000"/>
+              </a:srgbClr>
+            </a:outerShdw>
+          </a:effectLst>
+          <a:scene3d>
+            <a:camera prst="orthographicFront">
+              <a:rot lat="0" lon="0" rev="0"/>
+            </a:camera>
+            <a:lightRig rig="glow" dir="t">
+              <a:rot lat="0" lon="0" rev="4800000"/>
+            </a:lightRig>
+          </a:scene3d>
+          <a:sp3d prstMaterial="matte">
+            <a:bevelT w="127000" h="63500"/>
+          </a:sp3d>
+        </p:spPr>
+        <p:txBody>
+          <a:bodyPr>
+            <a:normAutofit/>
+          </a:bodyPr>
+          <a:lstStyle/>
+          <a:p>
+            <a:pPr algn="l"/>
+            <a:r>
+              <a:rPr lang="en-US" sz="2800" b="1" dirty="0" smtClean="0">
+                <a:solidFill>
+                  <a:schemeClr val="bg1"/>
+                </a:solidFill>
+                <a:latin typeface="Arial" panose="020B0604020202020204" pitchFamily="34" charset="0"/>
+                <a:cs typeface="Arial" panose="020B0604020202020204" pitchFamily="34" charset="0"/>
+              </a:rPr>
+              <a:t>Learning eSkills App</a:t>
+            </a:r>
+            <a:endParaRPr lang="en-US" sz="2800" b="1" dirty="0">
+              <a:solidFill>
+                <a:schemeClr val="bg1"/>
+              </a:solidFill>
+              <a:latin typeface="Arial" panose="020B0604020202020204" pitchFamily="34" charset="0"/>
+              <a:cs typeface="Arial" panose="020B0604020202020204" pitchFamily="34" charset="0"/>
+            </a:endParaRPr>
+          </a:p>
+        </p:txBody>
+      </p:sp>
+      <p:pic>
+        <p:nvPicPr>
+          <p:cNvPr id="2" name="Picture 1"/>
+          <p:cNvPicPr>
+            <a:picLocks noChangeAspect="1"/>
+          </p:cNvPicPr>
+          <p:nvPr/>
+        </p:nvPicPr>
+        <p:blipFill>
+          <a:blip r:embed="rId2"/>
+          <a:stretch>
+            <a:fillRect/>
+          </a:stretch>
+        </p:blipFill>
+        <p:spPr>
+          <a:xfrm>
+            <a:off x="398352" y="1394234"/>
+            <a:ext cx="2118512" cy="4412276"/>
+          </a:xfrm>
+          <a:prstGeom prst="rect">
+            <a:avLst/>
+          </a:prstGeom>
+          <a:ln>
+            <a:noFill/>
+          </a:ln>
+          <a:effectLst>
+            <a:outerShdw blurRad="149987" dist="250190" dir="8460000" algn="ctr">
+              <a:srgbClr val="000000">
+                <a:alpha val="28000"/>
+              </a:srgbClr>
+            </a:outerShdw>
+          </a:effectLst>
+          <a:scene3d>
+            <a:camera prst="orthographicFront">
+              <a:rot lat="0" lon="0" rev="0"/>
+            </a:camera>
+            <a:lightRig rig="contrasting" dir="t">
+              <a:rot lat="0" lon="0" rev="1500000"/>
+            </a:lightRig>
+          </a:scene3d>
+          <a:sp3d prstMaterial="metal">
+            <a:bevelT w="88900" h="88900"/>
+          </a:sp3d>
+        </p:spPr>
+      </p:pic>
+      <p:pic>
+        <p:nvPicPr>
+          <p:cNvPr id="8" name="Picture 7"/>
+          <p:cNvPicPr>
+            <a:picLocks noChangeAspect="1"/>
+          </p:cNvPicPr>
+          <p:nvPr/>
+        </p:nvPicPr>
+        <p:blipFill>
+          <a:blip r:embed="rId3"/>
+          <a:stretch>
+            <a:fillRect/>
+          </a:stretch>
+        </p:blipFill>
+        <p:spPr>
+          <a:xfrm>
+            <a:off x="2838260" y="1394235"/>
+            <a:ext cx="2123039" cy="4422136"/>
+          </a:xfrm>
+          <a:prstGeom prst="rect">
+            <a:avLst/>
+          </a:prstGeom>
+          <a:ln>
+            <a:noFill/>
+          </a:ln>
+          <a:effectLst>
+            <a:outerShdw blurRad="149987" dist="250190" dir="8460000" algn="ctr">
+              <a:srgbClr val="000000">
+                <a:alpha val="28000"/>
+              </a:srgbClr>
+            </a:outerShdw>
+          </a:effectLst>
+          <a:scene3d>
+            <a:camera prst="orthographicFront">
+              <a:rot lat="0" lon="0" rev="0"/>
+            </a:camera>
+            <a:lightRig rig="contrasting" dir="t">
+              <a:rot lat="0" lon="0" rev="1500000"/>
+            </a:lightRig>
+          </a:scene3d>
+          <a:sp3d prstMaterial="metal">
+            <a:bevelT w="88900" h="88900"/>
+          </a:sp3d>
+        </p:spPr>
+      </p:pic>
+      <p:pic>
+        <p:nvPicPr>
+          <p:cNvPr id="10" name="Picture 9"/>
+          <p:cNvPicPr>
+            <a:picLocks noChangeAspect="1"/>
+          </p:cNvPicPr>
+          <p:nvPr/>
+        </p:nvPicPr>
+        <p:blipFill>
+          <a:blip r:embed="rId4"/>
+          <a:stretch>
+            <a:fillRect/>
+          </a:stretch>
+        </p:blipFill>
+        <p:spPr>
+          <a:xfrm>
+            <a:off x="5293991" y="1394234"/>
+            <a:ext cx="2123083" cy="4412276"/>
+          </a:xfrm>
+          <a:prstGeom prst="rect">
+            <a:avLst/>
+          </a:prstGeom>
+          <a:ln>
+            <a:noFill/>
+          </a:ln>
+          <a:effectLst>
+            <a:outerShdw blurRad="149987" dist="250190" dir="8460000" algn="ctr">
+              <a:srgbClr val="000000">
+                <a:alpha val="28000"/>
+              </a:srgbClr>
+            </a:outerShdw>
+          </a:effectLst>
+          <a:scene3d>
+            <a:camera prst="orthographicFront">
+              <a:rot lat="0" lon="0" rev="0"/>
+            </a:camera>
+            <a:lightRig rig="contrasting" dir="t">
+              <a:rot lat="0" lon="0" rev="1500000"/>
+            </a:lightRig>
+          </a:scene3d>
+          <a:sp3d prstMaterial="metal">
+            <a:bevelT w="88900" h="88900"/>
+          </a:sp3d>
+        </p:spPr>
+      </p:pic>
+      <p:pic>
+        <p:nvPicPr>
+          <p:cNvPr id="11" name="Picture 10"/>
+          <p:cNvPicPr>
+            <a:picLocks noChangeAspect="1"/>
+          </p:cNvPicPr>
+          <p:nvPr/>
+        </p:nvPicPr>
+        <p:blipFill>
+          <a:blip r:embed="rId5"/>
+          <a:stretch>
+            <a:fillRect/>
+          </a:stretch>
+        </p:blipFill>
+        <p:spPr>
+          <a:xfrm>
+            <a:off x="7737453" y="1394234"/>
+            <a:ext cx="2133396" cy="4422137"/>
+          </a:xfrm>
+          <a:prstGeom prst="rect">
+            <a:avLst/>
+          </a:prstGeom>
+          <a:ln>
+            <a:noFill/>
+          </a:ln>
+          <a:effectLst>
+            <a:outerShdw blurRad="149987" dist="250190" dir="8460000" algn="ctr">
+              <a:srgbClr val="000000">
+                <a:alpha val="28000"/>
+              </a:srgbClr>
+            </a:outerShdw>
+          </a:effectLst>
+          <a:scene3d>
+            <a:camera prst="orthographicFront">
+              <a:rot lat="0" lon="0" rev="0"/>
+            </a:camera>
+            <a:lightRig rig="contrasting" dir="t">
+              <a:rot lat="0" lon="0" rev="1500000"/>
+            </a:lightRig>
+          </a:scene3d>
+          <a:sp3d prstMaterial="metal">
+            <a:bevelT w="88900" h="88900"/>
+          </a:sp3d>
+        </p:spPr>
+      </p:pic>
+    </p:spTree>
+    <p:extLst>
+      <p:ext uri="{BB962C8B-B14F-4D97-AF65-F5344CB8AC3E}">
+        <p14:creationId xmlns:p14="http://schemas.microsoft.com/office/powerpoint/2010/main" val="259644691"/>
+      </p:ext>
+    </p:extLst>
+  </p:cSld>
+  <p:clrMapOvr>
+    <a:masterClrMapping/>
+  </p:clrMapOvr>
+</p:sld>
+</file>
+
 <file path=ppt/theme/theme1.xml><?xml version="1.0" encoding="utf-8"?>
 <a:theme xmlns:a="http://schemas.openxmlformats.org/drawingml/2006/main" name="Office Theme">
   <a:themeElements>

</xml_diff>